<commit_message>
Update to Power Point Slides
</commit_message>
<xml_diff>
--- a/Power Point Slides.pptx
+++ b/Power Point Slides.pptx
@@ -210,7 +210,7 @@
           <a:p>
             <a:fld id="{8E6D9C41-ACD2-4E34-8C13-7240A0843E10}" type="datetimeFigureOut">
               <a:rPr lang="en-US" smtClean="0"/>
-              <a:t>1/8/2022</a:t>
+              <a:t>1/9/2022</a:t>
             </a:fld>
             <a:endParaRPr lang="en-US"/>
           </a:p>
@@ -723,7 +723,7 @@
           <a:p>
             <a:fld id="{9549D6DC-E1CB-4874-BF52-C3407230D20E}" type="datetime1">
               <a:rPr lang="en-US" smtClean="0"/>
-              <a:t>1/8/2022</a:t>
+              <a:t>1/9/2022</a:t>
             </a:fld>
             <a:endParaRPr lang="en-US"/>
           </a:p>
@@ -932,7 +932,7 @@
           <a:p>
             <a:fld id="{F7701D81-C4B9-4A87-89A7-22E29E6C9200}" type="datetime1">
               <a:rPr lang="en-US" smtClean="0"/>
-              <a:t>1/8/2022</a:t>
+              <a:t>1/9/2022</a:t>
             </a:fld>
             <a:endParaRPr lang="en-US"/>
           </a:p>
@@ -1142,7 +1142,7 @@
           <a:p>
             <a:fld id="{EE307718-69F7-427E-95A3-C1246AF46913}" type="datetime1">
               <a:rPr lang="en-US" smtClean="0"/>
-              <a:t>1/8/2022</a:t>
+              <a:t>1/9/2022</a:t>
             </a:fld>
             <a:endParaRPr lang="en-US"/>
           </a:p>
@@ -1342,7 +1342,7 @@
           <a:p>
             <a:fld id="{48913E51-B7F7-4C24-B8E3-5471755DC0E0}" type="datetime1">
               <a:rPr lang="en-US" smtClean="0"/>
-              <a:t>1/8/2022</a:t>
+              <a:t>1/9/2022</a:t>
             </a:fld>
             <a:endParaRPr lang="en-US"/>
           </a:p>
@@ -1623,7 +1623,7 @@
           <a:p>
             <a:fld id="{DA91A59F-D956-4598-A3C1-AE72A5387751}" type="datetime1">
               <a:rPr lang="en-US" smtClean="0"/>
-              <a:t>1/8/2022</a:t>
+              <a:t>1/9/2022</a:t>
             </a:fld>
             <a:endParaRPr lang="en-US" dirty="0"/>
           </a:p>
@@ -1891,7 +1891,7 @@
           <a:p>
             <a:fld id="{D70BBD69-7BD3-4731-8064-242619E92CBE}" type="datetime1">
               <a:rPr lang="en-US" smtClean="0"/>
-              <a:t>1/8/2022</a:t>
+              <a:t>1/9/2022</a:t>
             </a:fld>
             <a:endParaRPr lang="en-US"/>
           </a:p>
@@ -2346,7 +2346,7 @@
           <a:p>
             <a:fld id="{38BD77D9-239F-488B-9358-023C46BC7084}" type="datetime1">
               <a:rPr lang="en-US" smtClean="0"/>
-              <a:t>1/8/2022</a:t>
+              <a:t>1/9/2022</a:t>
             </a:fld>
             <a:endParaRPr lang="en-US"/>
           </a:p>
@@ -2493,7 +2493,7 @@
           <a:p>
             <a:fld id="{1EE61C24-7140-4FDE-92F3-654C6E2D3C1C}" type="datetime1">
               <a:rPr lang="en-US" smtClean="0"/>
-              <a:t>1/8/2022</a:t>
+              <a:t>1/9/2022</a:t>
             </a:fld>
             <a:endParaRPr lang="en-US"/>
           </a:p>
@@ -2606,7 +2606,7 @@
           <a:p>
             <a:fld id="{DC4D6ACF-ECB9-4B5F-A429-08B8AC75E8EF}" type="datetime1">
               <a:rPr lang="en-US" smtClean="0"/>
-              <a:t>1/8/2022</a:t>
+              <a:t>1/9/2022</a:t>
             </a:fld>
             <a:endParaRPr lang="en-US"/>
           </a:p>
@@ -2925,7 +2925,7 @@
           <a:p>
             <a:fld id="{788B429B-EE2A-486A-BDB9-0C848B4FAFDD}" type="datetime1">
               <a:rPr lang="en-US" smtClean="0"/>
-              <a:t>1/8/2022</a:t>
+              <a:t>1/9/2022</a:t>
             </a:fld>
             <a:endParaRPr lang="en-US"/>
           </a:p>
@@ -3222,7 +3222,7 @@
           <a:p>
             <a:fld id="{8DA5FE4A-CB8D-40AB-BFFC-AAF37EA071CB}" type="datetime1">
               <a:rPr lang="en-US" smtClean="0"/>
-              <a:t>1/8/2022</a:t>
+              <a:t>1/9/2022</a:t>
             </a:fld>
             <a:endParaRPr lang="en-US"/>
           </a:p>
@@ -3870,7 +3870,7 @@
           <a:p>
             <a:fld id="{C0517C94-3B1E-4991-BED3-41F8B0158A00}" type="datetime1">
               <a:rPr lang="en-US" smtClean="0"/>
-              <a:t>1/8/2022</a:t>
+              <a:t>1/9/2022</a:t>
             </a:fld>
             <a:endParaRPr lang="en-US" dirty="0"/>
           </a:p>
@@ -8721,7 +8721,7 @@
                 <a:ea typeface="Calibri" panose="020F0502020204030204" pitchFamily="34" charset="0"/>
                 <a:cs typeface="Times New Roman" panose="02020603050405020304" pitchFamily="18" charset="0"/>
               </a:rPr>
-              <a:t> [https://www.census.gov/data/developers/data-sets.html](https://www.census.gov/data/developers/data-sets.html)</a:t>
+              <a:t>https://www.census.gov/data/developers/data-sets.html</a:t>
             </a:r>
           </a:p>
           <a:p>

</xml_diff>